<commit_message>
Cambios en presentación medibyte
</commit_message>
<xml_diff>
--- a/documents/Propuesta Integración de Ideas.pptx
+++ b/documents/Propuesta Integración de Ideas.pptx
@@ -105,6 +105,11 @@
       </a:defRPr>
     </a:lvl9pPr>
   </p:defaultTextStyle>
+  <p:extLst>
+    <p:ext uri="{EFAFB233-063F-42B5-8137-9DF3F51BA10A}">
+      <p15:sldGuideLst xmlns:p15="http://schemas.microsoft.com/office/powerpoint/2012/main"/>
+    </p:ext>
+  </p:extLst>
 </p:presentation>
 </file>
 
@@ -257,7 +262,7 @@
           <a:p>
             <a:fld id="{4CAD1CFC-FB23-40ED-BD43-F1DC23167532}" type="datetimeFigureOut">
               <a:rPr lang="es-CO" smtClean="0"/>
-              <a:t>19/05/2022</a:t>
+              <a:t>27/05/2022</a:t>
             </a:fld>
             <a:endParaRPr lang="es-CO"/>
           </a:p>
@@ -457,7 +462,7 @@
           <a:p>
             <a:fld id="{4CAD1CFC-FB23-40ED-BD43-F1DC23167532}" type="datetimeFigureOut">
               <a:rPr lang="es-CO" smtClean="0"/>
-              <a:t>19/05/2022</a:t>
+              <a:t>27/05/2022</a:t>
             </a:fld>
             <a:endParaRPr lang="es-CO"/>
           </a:p>
@@ -667,7 +672,7 @@
           <a:p>
             <a:fld id="{4CAD1CFC-FB23-40ED-BD43-F1DC23167532}" type="datetimeFigureOut">
               <a:rPr lang="es-CO" smtClean="0"/>
-              <a:t>19/05/2022</a:t>
+              <a:t>27/05/2022</a:t>
             </a:fld>
             <a:endParaRPr lang="es-CO"/>
           </a:p>
@@ -867,7 +872,7 @@
           <a:p>
             <a:fld id="{4CAD1CFC-FB23-40ED-BD43-F1DC23167532}" type="datetimeFigureOut">
               <a:rPr lang="es-CO" smtClean="0"/>
-              <a:t>19/05/2022</a:t>
+              <a:t>27/05/2022</a:t>
             </a:fld>
             <a:endParaRPr lang="es-CO"/>
           </a:p>
@@ -1143,7 +1148,7 @@
           <a:p>
             <a:fld id="{4CAD1CFC-FB23-40ED-BD43-F1DC23167532}" type="datetimeFigureOut">
               <a:rPr lang="es-CO" smtClean="0"/>
-              <a:t>19/05/2022</a:t>
+              <a:t>27/05/2022</a:t>
             </a:fld>
             <a:endParaRPr lang="es-CO"/>
           </a:p>
@@ -1411,7 +1416,7 @@
           <a:p>
             <a:fld id="{4CAD1CFC-FB23-40ED-BD43-F1DC23167532}" type="datetimeFigureOut">
               <a:rPr lang="es-CO" smtClean="0"/>
-              <a:t>19/05/2022</a:t>
+              <a:t>27/05/2022</a:t>
             </a:fld>
             <a:endParaRPr lang="es-CO"/>
           </a:p>
@@ -1826,7 +1831,7 @@
           <a:p>
             <a:fld id="{4CAD1CFC-FB23-40ED-BD43-F1DC23167532}" type="datetimeFigureOut">
               <a:rPr lang="es-CO" smtClean="0"/>
-              <a:t>19/05/2022</a:t>
+              <a:t>27/05/2022</a:t>
             </a:fld>
             <a:endParaRPr lang="es-CO"/>
           </a:p>
@@ -1968,7 +1973,7 @@
           <a:p>
             <a:fld id="{4CAD1CFC-FB23-40ED-BD43-F1DC23167532}" type="datetimeFigureOut">
               <a:rPr lang="es-CO" smtClean="0"/>
-              <a:t>19/05/2022</a:t>
+              <a:t>27/05/2022</a:t>
             </a:fld>
             <a:endParaRPr lang="es-CO"/>
           </a:p>
@@ -2081,7 +2086,7 @@
           <a:p>
             <a:fld id="{4CAD1CFC-FB23-40ED-BD43-F1DC23167532}" type="datetimeFigureOut">
               <a:rPr lang="es-CO" smtClean="0"/>
-              <a:t>19/05/2022</a:t>
+              <a:t>27/05/2022</a:t>
             </a:fld>
             <a:endParaRPr lang="es-CO"/>
           </a:p>
@@ -2394,7 +2399,7 @@
           <a:p>
             <a:fld id="{4CAD1CFC-FB23-40ED-BD43-F1DC23167532}" type="datetimeFigureOut">
               <a:rPr lang="es-CO" smtClean="0"/>
-              <a:t>19/05/2022</a:t>
+              <a:t>27/05/2022</a:t>
             </a:fld>
             <a:endParaRPr lang="es-CO"/>
           </a:p>
@@ -2683,7 +2688,7 @@
           <a:p>
             <a:fld id="{4CAD1CFC-FB23-40ED-BD43-F1DC23167532}" type="datetimeFigureOut">
               <a:rPr lang="es-CO" smtClean="0"/>
-              <a:t>19/05/2022</a:t>
+              <a:t>27/05/2022</a:t>
             </a:fld>
             <a:endParaRPr lang="es-CO"/>
           </a:p>
@@ -2926,7 +2931,7 @@
           <a:p>
             <a:fld id="{4CAD1CFC-FB23-40ED-BD43-F1DC23167532}" type="datetimeFigureOut">
               <a:rPr lang="es-CO" smtClean="0"/>
-              <a:t>19/05/2022</a:t>
+              <a:t>27/05/2022</a:t>
             </a:fld>
             <a:endParaRPr lang="es-CO"/>
           </a:p>
@@ -4705,7 +4710,7 @@
         </p:nvSpPr>
         <p:spPr>
           <a:xfrm>
-            <a:off x="2630556" y="3036549"/>
+            <a:off x="1800562" y="3036549"/>
             <a:ext cx="6930888" cy="369332"/>
           </a:xfrm>
           <a:prstGeom prst="rect">
@@ -5213,8 +5218,8 @@
         </p:nvCxnSpPr>
         <p:spPr>
           <a:xfrm flipH="1">
-            <a:off x="9561444" y="1811225"/>
-            <a:ext cx="1265580" cy="1409990"/>
+            <a:off x="8731450" y="1811225"/>
+            <a:ext cx="2095574" cy="1409990"/>
           </a:xfrm>
           <a:prstGeom prst="straightConnector1">
             <a:avLst/>
@@ -5252,7 +5257,7 @@
         </p:nvSpPr>
         <p:spPr>
           <a:xfrm>
-            <a:off x="9813235" y="2277939"/>
+            <a:off x="8890475" y="2088224"/>
             <a:ext cx="3127511" cy="369332"/>
           </a:xfrm>
           <a:prstGeom prst="rect">
@@ -5300,7 +5305,7 @@
         </p:nvSpPr>
         <p:spPr>
           <a:xfrm>
-            <a:off x="9813234" y="2584857"/>
+            <a:off x="8890474" y="2395142"/>
             <a:ext cx="3127511" cy="923330"/>
           </a:xfrm>
           <a:prstGeom prst="rect">
@@ -5364,8 +5369,8 @@
         </p:nvCxnSpPr>
         <p:spPr>
           <a:xfrm flipH="1">
-            <a:off x="7745893" y="3508187"/>
-            <a:ext cx="3631097" cy="305274"/>
+            <a:off x="7745893" y="3318472"/>
+            <a:ext cx="2708337" cy="494989"/>
           </a:xfrm>
           <a:prstGeom prst="straightConnector1">
             <a:avLst/>
@@ -5399,13 +5404,13 @@
   <p:clrMapOvr>
     <a:masterClrMapping/>
   </p:clrMapOvr>
-  <mc:AlternateContent xmlns:mc="http://schemas.openxmlformats.org/markup-compatibility/2006">
-    <mc:Choice xmlns:p159="http://schemas.microsoft.com/office/powerpoint/2015/09/main" Requires="p159">
+  <mc:AlternateContent xmlns:mc="http://schemas.openxmlformats.org/markup-compatibility/2006" xmlns:p159="http://schemas.microsoft.com/office/powerpoint/2015/09/main">
+    <mc:Choice Requires="p159">
       <p:transition xmlns:p14="http://schemas.microsoft.com/office/powerpoint/2010/main" spd="slow" p14:dur="2000">
         <p159:morph option="byObject"/>
       </p:transition>
     </mc:Choice>
-    <mc:Fallback>
+    <mc:Fallback xmlns="">
       <p:transition spd="slow">
         <p:fade/>
       </p:transition>

</xml_diff>